<commit_message>
Fixed derivative for w_i parameter
</commit_message>
<xml_diff>
--- a/Lecture1/DNN ISP -Lecture1.pptx
+++ b/Lecture1/DNN ISP -Lecture1.pptx
@@ -19172,8 +19172,8 @@
           </a:p>
         </p:txBody>
       </p:sp>
-      <mc:AlternateContent xmlns:mc="http://schemas.openxmlformats.org/markup-compatibility/2006" xmlns:a14="http://schemas.microsoft.com/office/drawing/2010/main">
-        <mc:Choice Requires="a14">
+      <mc:AlternateContent xmlns:mc="http://schemas.openxmlformats.org/markup-compatibility/2006">
+        <mc:Choice xmlns:a14="http://schemas.microsoft.com/office/drawing/2010/main" Requires="a14">
           <p:sp>
             <p:nvSpPr>
               <p:cNvPr id="3" name="Content Placeholder 2">
@@ -19639,7 +19639,7 @@
                             <a:rPr lang="en-US" b="0" i="1" smtClean="0">
                               <a:latin typeface="Cambria Math" panose="02040503050406030204" pitchFamily="18" charset="0"/>
                             </a:rPr>
-                            <m:t>𝑤</m:t>
+                            <m:t>𝑥</m:t>
                           </m:r>
                         </m:e>
                         <m:sub>
@@ -19940,7 +19940,7 @@
             </p:txBody>
           </p:sp>
         </mc:Choice>
-        <mc:Fallback xmlns="">
+        <mc:Fallback>
           <p:sp>
             <p:nvSpPr>
               <p:cNvPr id="3" name="Content Placeholder 2">
@@ -20041,15 +20041,33 @@
                                   </p:childTnLst>
                                 </p:cTn>
                               </p:par>
+                            </p:childTnLst>
+                          </p:cTn>
+                        </p:par>
+                      </p:childTnLst>
+                    </p:cTn>
+                  </p:par>
+                  <p:par>
+                    <p:cTn id="7" fill="hold">
+                      <p:stCondLst>
+                        <p:cond delay="indefinite"/>
+                      </p:stCondLst>
+                      <p:childTnLst>
+                        <p:par>
+                          <p:cTn id="8" fill="hold">
+                            <p:stCondLst>
+                              <p:cond delay="0"/>
+                            </p:stCondLst>
+                            <p:childTnLst>
                               <p:par>
-                                <p:cTn id="7" presetID="1" presetClass="entr" presetSubtype="0" fill="hold" nodeType="withEffect">
+                                <p:cTn id="9" presetID="1" presetClass="entr" presetSubtype="0" fill="hold" nodeType="clickEffect">
                                   <p:stCondLst>
                                     <p:cond delay="0"/>
                                   </p:stCondLst>
                                   <p:childTnLst>
                                     <p:set>
                                       <p:cBhvr>
-                                        <p:cTn id="8" dur="1" fill="hold">
+                                        <p:cTn id="10" dur="1" fill="hold">
                                           <p:stCondLst>
                                             <p:cond delay="0"/>
                                           </p:stCondLst>
@@ -20079,26 +20097,26 @@
                     </p:cTn>
                   </p:par>
                   <p:par>
-                    <p:cTn id="9" fill="hold">
+                    <p:cTn id="11" fill="hold">
                       <p:stCondLst>
                         <p:cond delay="indefinite"/>
                       </p:stCondLst>
                       <p:childTnLst>
                         <p:par>
-                          <p:cTn id="10" fill="hold">
+                          <p:cTn id="12" fill="hold">
                             <p:stCondLst>
                               <p:cond delay="0"/>
                             </p:stCondLst>
                             <p:childTnLst>
                               <p:par>
-                                <p:cTn id="11" presetID="1" presetClass="entr" presetSubtype="0" fill="hold" nodeType="clickEffect">
+                                <p:cTn id="13" presetID="1" presetClass="entr" presetSubtype="0" fill="hold" nodeType="clickEffect">
                                   <p:stCondLst>
                                     <p:cond delay="0"/>
                                   </p:stCondLst>
                                   <p:childTnLst>
                                     <p:set>
                                       <p:cBhvr>
-                                        <p:cTn id="12" dur="1" fill="hold">
+                                        <p:cTn id="14" dur="1" fill="hold">
                                           <p:stCondLst>
                                             <p:cond delay="0"/>
                                           </p:stCondLst>
@@ -20121,15 +20139,33 @@
                                   </p:childTnLst>
                                 </p:cTn>
                               </p:par>
+                            </p:childTnLst>
+                          </p:cTn>
+                        </p:par>
+                      </p:childTnLst>
+                    </p:cTn>
+                  </p:par>
+                  <p:par>
+                    <p:cTn id="15" fill="hold">
+                      <p:stCondLst>
+                        <p:cond delay="indefinite"/>
+                      </p:stCondLst>
+                      <p:childTnLst>
+                        <p:par>
+                          <p:cTn id="16" fill="hold">
+                            <p:stCondLst>
+                              <p:cond delay="0"/>
+                            </p:stCondLst>
+                            <p:childTnLst>
                               <p:par>
-                                <p:cTn id="13" presetID="1" presetClass="entr" presetSubtype="0" fill="hold" nodeType="withEffect">
+                                <p:cTn id="17" presetID="1" presetClass="entr" presetSubtype="0" fill="hold" nodeType="clickEffect">
                                   <p:stCondLst>
                                     <p:cond delay="0"/>
                                   </p:stCondLst>
                                   <p:childTnLst>
                                     <p:set>
                                       <p:cBhvr>
-                                        <p:cTn id="14" dur="1" fill="hold">
+                                        <p:cTn id="18" dur="1" fill="hold">
                                           <p:stCondLst>
                                             <p:cond delay="0"/>
                                           </p:stCondLst>
@@ -20152,15 +20188,33 @@
                                   </p:childTnLst>
                                 </p:cTn>
                               </p:par>
+                            </p:childTnLst>
+                          </p:cTn>
+                        </p:par>
+                      </p:childTnLst>
+                    </p:cTn>
+                  </p:par>
+                  <p:par>
+                    <p:cTn id="19" fill="hold">
+                      <p:stCondLst>
+                        <p:cond delay="indefinite"/>
+                      </p:stCondLst>
+                      <p:childTnLst>
+                        <p:par>
+                          <p:cTn id="20" fill="hold">
+                            <p:stCondLst>
+                              <p:cond delay="0"/>
+                            </p:stCondLst>
+                            <p:childTnLst>
                               <p:par>
-                                <p:cTn id="15" presetID="1" presetClass="entr" presetSubtype="0" fill="hold" nodeType="withEffect">
+                                <p:cTn id="21" presetID="1" presetClass="entr" presetSubtype="0" fill="hold" nodeType="clickEffect">
                                   <p:stCondLst>
                                     <p:cond delay="0"/>
                                   </p:stCondLst>
                                   <p:childTnLst>
                                     <p:set>
                                       <p:cBhvr>
-                                        <p:cTn id="16" dur="1" fill="hold">
+                                        <p:cTn id="22" dur="1" fill="hold">
                                           <p:stCondLst>
                                             <p:cond delay="0"/>
                                           </p:stCondLst>
@@ -20190,26 +20244,26 @@
                     </p:cTn>
                   </p:par>
                   <p:par>
-                    <p:cTn id="17" fill="hold">
+                    <p:cTn id="23" fill="hold">
                       <p:stCondLst>
                         <p:cond delay="indefinite"/>
                       </p:stCondLst>
                       <p:childTnLst>
                         <p:par>
-                          <p:cTn id="18" fill="hold">
+                          <p:cTn id="24" fill="hold">
                             <p:stCondLst>
                               <p:cond delay="0"/>
                             </p:stCondLst>
                             <p:childTnLst>
                               <p:par>
-                                <p:cTn id="19" presetID="1" presetClass="entr" presetSubtype="0" fill="hold" nodeType="clickEffect">
+                                <p:cTn id="25" presetID="1" presetClass="entr" presetSubtype="0" fill="hold" nodeType="clickEffect">
                                   <p:stCondLst>
                                     <p:cond delay="0"/>
                                   </p:stCondLst>
                                   <p:childTnLst>
                                     <p:set>
                                       <p:cBhvr>
-                                        <p:cTn id="20" dur="1" fill="hold">
+                                        <p:cTn id="26" dur="1" fill="hold">
                                           <p:stCondLst>
                                             <p:cond delay="0"/>
                                           </p:stCondLst>
@@ -20232,15 +20286,33 @@
                                   </p:childTnLst>
                                 </p:cTn>
                               </p:par>
+                            </p:childTnLst>
+                          </p:cTn>
+                        </p:par>
+                      </p:childTnLst>
+                    </p:cTn>
+                  </p:par>
+                  <p:par>
+                    <p:cTn id="27" fill="hold">
+                      <p:stCondLst>
+                        <p:cond delay="indefinite"/>
+                      </p:stCondLst>
+                      <p:childTnLst>
+                        <p:par>
+                          <p:cTn id="28" fill="hold">
+                            <p:stCondLst>
+                              <p:cond delay="0"/>
+                            </p:stCondLst>
+                            <p:childTnLst>
                               <p:par>
-                                <p:cTn id="21" presetID="1" presetClass="entr" presetSubtype="0" fill="hold" nodeType="withEffect">
+                                <p:cTn id="29" presetID="1" presetClass="entr" presetSubtype="0" fill="hold" nodeType="clickEffect">
                                   <p:stCondLst>
                                     <p:cond delay="0"/>
                                   </p:stCondLst>
                                   <p:childTnLst>
                                     <p:set>
                                       <p:cBhvr>
-                                        <p:cTn id="22" dur="1" fill="hold">
+                                        <p:cTn id="30" dur="1" fill="hold">
                                           <p:stCondLst>
                                             <p:cond delay="0"/>
                                           </p:stCondLst>

</xml_diff>